<commit_message>
atualização slides de aulas 21Set2023
</commit_message>
<xml_diff>
--- a/01 Classes/Aula 08 Desenvolvimento Web PHP - JS.pptx
+++ b/01 Classes/Aula 08 Desenvolvimento Web PHP - JS.pptx
@@ -7543,7 +7543,7 @@
         </p:nvSpPr>
         <p:spPr>
           <a:xfrm>
-            <a:off x="142865" y="1037312"/>
+            <a:off x="130165" y="1037312"/>
             <a:ext cx="8865056" cy="3900208"/>
           </a:xfrm>
         </p:spPr>
@@ -7646,7 +7646,7 @@
                 <a:latin typeface="Times New Roman" panose="02020603050405020304" pitchFamily="18" charset="0"/>
                 <a:cs typeface="Times New Roman" panose="02020603050405020304" pitchFamily="18" charset="0"/>
               </a:rPr>
-              <a:t>(‘</a:t>
+              <a:t>('</a:t>
             </a:r>
             <a:r>
               <a:rPr lang="pt-BR" sz="2000" dirty="0" err="1">
@@ -7686,7 +7686,7 @@
                 <a:latin typeface="Times New Roman" panose="02020603050405020304" pitchFamily="18" charset="0"/>
                 <a:cs typeface="Times New Roman" panose="02020603050405020304" pitchFamily="18" charset="0"/>
               </a:rPr>
-              <a:t>’).</a:t>
+              <a:t>').</a:t>
             </a:r>
             <a:r>
               <a:rPr lang="pt-BR" sz="2000" dirty="0" err="1">
@@ -7706,7 +7706,7 @@
                 <a:latin typeface="Times New Roman" panose="02020603050405020304" pitchFamily="18" charset="0"/>
                 <a:cs typeface="Times New Roman" panose="02020603050405020304" pitchFamily="18" charset="0"/>
               </a:rPr>
-              <a:t> = ‘</a:t>
+              <a:t> = '</a:t>
             </a:r>
             <a:r>
               <a:rPr lang="pt-BR" sz="2000" dirty="0" err="1">
@@ -7726,7 +7726,7 @@
                 <a:latin typeface="Times New Roman" panose="02020603050405020304" pitchFamily="18" charset="0"/>
                 <a:cs typeface="Times New Roman" panose="02020603050405020304" pitchFamily="18" charset="0"/>
               </a:rPr>
-              <a:t>’;</a:t>
+              <a:t>';</a:t>
             </a:r>
           </a:p>
           <a:p>
@@ -7771,7 +7771,7 @@
                 <a:latin typeface="Times New Roman" panose="02020603050405020304" pitchFamily="18" charset="0"/>
                 <a:cs typeface="Times New Roman" panose="02020603050405020304" pitchFamily="18" charset="0"/>
               </a:rPr>
-              <a:t>(‘h1</a:t>
+              <a:t>('h1</a:t>
             </a:r>
             <a:r>
               <a:rPr lang="pt-BR" sz="2000" b="1" dirty="0">
@@ -7791,7 +7791,7 @@
                 <a:latin typeface="Times New Roman" panose="02020603050405020304" pitchFamily="18" charset="0"/>
                 <a:cs typeface="Times New Roman" panose="02020603050405020304" pitchFamily="18" charset="0"/>
               </a:rPr>
-              <a:t>classH1’).</a:t>
+              <a:t>classH1').</a:t>
             </a:r>
             <a:r>
               <a:rPr lang="pt-BR" sz="2000" dirty="0" err="1">
@@ -7811,7 +7811,7 @@
                 <a:latin typeface="Times New Roman" panose="02020603050405020304" pitchFamily="18" charset="0"/>
                 <a:cs typeface="Times New Roman" panose="02020603050405020304" pitchFamily="18" charset="0"/>
               </a:rPr>
-              <a:t> = ‘Texto’;</a:t>
+              <a:t> = 'Texto';</a:t>
             </a:r>
           </a:p>
           <a:p>
@@ -7888,7 +7888,7 @@
                 <a:latin typeface="Times New Roman" panose="02020603050405020304" pitchFamily="18" charset="0"/>
                 <a:cs typeface="Times New Roman" panose="02020603050405020304" pitchFamily="18" charset="0"/>
               </a:rPr>
-              <a:t>(‘p’)[1] ); // </a:t>
+              <a:t>('p')[1] ); // </a:t>
             </a:r>
             <a:r>
               <a:rPr lang="pt-BR" sz="2000" b="1" dirty="0">
@@ -8359,7 +8359,7 @@
                 <a:latin typeface="Times New Roman" panose="02020603050405020304" pitchFamily="18" charset="0"/>
                 <a:cs typeface="Times New Roman" panose="02020603050405020304" pitchFamily="18" charset="0"/>
               </a:rPr>
-              <a:t>.body.style.backgroud</a:t>
+              <a:t>.body.style.background</a:t>
             </a:r>
             <a:r>
               <a:rPr lang="pt-BR" sz="2000" dirty="0">
@@ -8369,7 +8369,7 @@
                 <a:latin typeface="Times New Roman" panose="02020603050405020304" pitchFamily="18" charset="0"/>
                 <a:cs typeface="Times New Roman" panose="02020603050405020304" pitchFamily="18" charset="0"/>
               </a:rPr>
-              <a:t>= ‘</a:t>
+              <a:t>= '</a:t>
             </a:r>
             <a:r>
               <a:rPr lang="pt-BR" sz="2000" b="1" dirty="0">
@@ -8389,7 +8389,7 @@
                 <a:latin typeface="Times New Roman" panose="02020603050405020304" pitchFamily="18" charset="0"/>
                 <a:cs typeface="Times New Roman" panose="02020603050405020304" pitchFamily="18" charset="0"/>
               </a:rPr>
-              <a:t>’;</a:t>
+              <a:t>';</a:t>
             </a:r>
           </a:p>
           <a:p>
@@ -9451,7 +9451,7 @@
                 <a:latin typeface="Times New Roman" panose="02020603050405020304" pitchFamily="18" charset="0"/>
                 <a:cs typeface="Times New Roman" panose="02020603050405020304" pitchFamily="18" charset="0"/>
               </a:rPr>
-              <a:t>(‘Olá, mundo!!!’)</a:t>
+              <a:t>('Olá, mundo!!! ')</a:t>
             </a:r>
           </a:p>
           <a:p>
@@ -9686,7 +9686,7 @@
                 <a:latin typeface="Times New Roman" panose="02020603050405020304" pitchFamily="18" charset="0"/>
                 <a:cs typeface="Times New Roman" panose="02020603050405020304" pitchFamily="18" charset="0"/>
               </a:rPr>
-              <a:t>(‘</a:t>
+              <a:t>('</a:t>
             </a:r>
             <a:r>
               <a:rPr lang="pt-BR" sz="2400" dirty="0" err="1">
@@ -9706,7 +9706,7 @@
                 <a:latin typeface="Times New Roman" panose="02020603050405020304" pitchFamily="18" charset="0"/>
                 <a:cs typeface="Times New Roman" panose="02020603050405020304" pitchFamily="18" charset="0"/>
               </a:rPr>
-              <a:t>’).</a:t>
+              <a:t>').</a:t>
             </a:r>
             <a:r>
               <a:rPr lang="pt-BR" sz="2400" dirty="0" err="1">
@@ -9726,7 +9726,7 @@
                 <a:latin typeface="Times New Roman" panose="02020603050405020304" pitchFamily="18" charset="0"/>
                 <a:cs typeface="Times New Roman" panose="02020603050405020304" pitchFamily="18" charset="0"/>
               </a:rPr>
-              <a:t> := ‘Texto’;</a:t>
+              <a:t> := 'Texto';</a:t>
             </a:r>
           </a:p>
           <a:p>
@@ -9828,7 +9828,7 @@
                 <a:latin typeface="Times New Roman" panose="02020603050405020304" pitchFamily="18" charset="0"/>
                 <a:cs typeface="Times New Roman" panose="02020603050405020304" pitchFamily="18" charset="0"/>
               </a:rPr>
-              <a:t>(‘</a:t>
+              <a:t>('</a:t>
             </a:r>
             <a:r>
               <a:rPr lang="pt-BR" sz="2400" dirty="0" err="1">
@@ -9848,7 +9848,7 @@
                 <a:latin typeface="Times New Roman" panose="02020603050405020304" pitchFamily="18" charset="0"/>
                 <a:cs typeface="Times New Roman" panose="02020603050405020304" pitchFamily="18" charset="0"/>
               </a:rPr>
-              <a:t>’).</a:t>
+              <a:t>').</a:t>
             </a:r>
             <a:r>
               <a:rPr lang="pt-BR" sz="2400" dirty="0" err="1">
@@ -10869,7 +10869,7 @@
                 <a:latin typeface="Times New Roman" panose="02020603050405020304" pitchFamily="18" charset="0"/>
                 <a:cs typeface="Times New Roman" panose="02020603050405020304" pitchFamily="18" charset="0"/>
               </a:rPr>
-              <a:t> nome = ‘maria’;</a:t>
+              <a:t> nome = 'maria';</a:t>
             </a:r>
           </a:p>
           <a:p>
@@ -11249,27 +11249,7 @@
                 <a:latin typeface="Times New Roman" panose="02020603050405020304" pitchFamily="18" charset="0"/>
                 <a:cs typeface="Times New Roman" panose="02020603050405020304" pitchFamily="18" charset="0"/>
               </a:rPr>
-              <a:t> x, </a:t>
-            </a:r>
-            <a:r>
-              <a:rPr lang="pt-BR" sz="2400" dirty="0" err="1">
-                <a:solidFill>
-                  <a:schemeClr val="tx1"/>
-                </a:solidFill>
-                <a:latin typeface="Times New Roman" panose="02020603050405020304" pitchFamily="18" charset="0"/>
-                <a:cs typeface="Times New Roman" panose="02020603050405020304" pitchFamily="18" charset="0"/>
-              </a:rPr>
-              <a:t>y,z</a:t>
-            </a:r>
-            <a:r>
-              <a:rPr lang="pt-BR" sz="2400" dirty="0">
-                <a:solidFill>
-                  <a:schemeClr val="tx1"/>
-                </a:solidFill>
-                <a:latin typeface="Times New Roman" panose="02020603050405020304" pitchFamily="18" charset="0"/>
-                <a:cs typeface="Times New Roman" panose="02020603050405020304" pitchFamily="18" charset="0"/>
-              </a:rPr>
-              <a:t>; // Declaração de variáveis (</a:t>
+              <a:t> x, y, z; // Declaração de variáveis (</a:t>
             </a:r>
             <a:r>
               <a:rPr lang="pt-BR" sz="2400" dirty="0" err="1">
@@ -11911,7 +11891,7 @@
                 <a:latin typeface="Times New Roman" panose="02020603050405020304" pitchFamily="18" charset="0"/>
                 <a:cs typeface="Times New Roman" panose="02020603050405020304" pitchFamily="18" charset="0"/>
               </a:rPr>
-              <a:t> := ‘Texto &lt;b&gt;Alterado&lt;/b&gt;’;</a:t>
+              <a:t> := 'Texto &lt;b&gt;Alterado&lt;/b&gt;';</a:t>
             </a:r>
           </a:p>
         </p:txBody>
@@ -12499,7 +12479,7 @@
                 <a:latin typeface="Times New Roman" panose="02020603050405020304" pitchFamily="18" charset="0"/>
                 <a:cs typeface="Times New Roman" panose="02020603050405020304" pitchFamily="18" charset="0"/>
               </a:rPr>
-              <a:t>(‘Teste JS no terminal do desenvolvedor’):</a:t>
+              <a:t>(‘Testa JS no terminal do desenvolvedor’):</a:t>
             </a:r>
           </a:p>
           <a:p>
@@ -12560,7 +12540,7 @@
                 <a:latin typeface="Times New Roman" panose="02020603050405020304" pitchFamily="18" charset="0"/>
                 <a:cs typeface="Times New Roman" panose="02020603050405020304" pitchFamily="18" charset="0"/>
               </a:rPr>
-              <a:t> (‘Alerta na tela’);</a:t>
+              <a:t> ('Alerta na tela');</a:t>
             </a:r>
           </a:p>
           <a:p>

</xml_diff>

<commit_message>
Exec PHP 14/10/2024 2024.2
</commit_message>
<xml_diff>
--- a/01 Classes/Aula 08 Desenvolvimento Web PHP - JS.pptx
+++ b/01 Classes/Aula 08 Desenvolvimento Web PHP - JS.pptx
@@ -9716,7 +9716,7 @@
                 <a:latin typeface="Times New Roman" panose="02020603050405020304" pitchFamily="18" charset="0"/>
                 <a:cs typeface="Times New Roman" panose="02020603050405020304" pitchFamily="18" charset="0"/>
               </a:rPr>
-              <a:t>InnerHTML</a:t>
+              <a:t>InnerText</a:t>
             </a:r>
             <a:r>
               <a:rPr lang="pt-BR" sz="2400" dirty="0">
@@ -9858,7 +9858,7 @@
                 <a:latin typeface="Times New Roman" panose="02020603050405020304" pitchFamily="18" charset="0"/>
                 <a:cs typeface="Times New Roman" panose="02020603050405020304" pitchFamily="18" charset="0"/>
               </a:rPr>
-              <a:t>InnerHTML</a:t>
+              <a:t>InnerText</a:t>
             </a:r>
             <a:r>
               <a:rPr lang="pt-BR" sz="2400" dirty="0">
@@ -12181,7 +12181,7 @@
                 <a:latin typeface="Times New Roman" panose="02020603050405020304" pitchFamily="18" charset="0"/>
                 <a:cs typeface="Times New Roman" panose="02020603050405020304" pitchFamily="18" charset="0"/>
               </a:rPr>
-              <a:t>: \u{1F609}; \u{1F449}; \u{1F3c1}</a:t>
+              <a:t>: \u{1F609}; \u{1F449}; \u{1F3c1}; &amp;#128521 no HTML</a:t>
             </a:r>
           </a:p>
           <a:p>

</xml_diff>